<commit_message>
Updates for lecture 7 and other minor edits.
</commit_message>
<xml_diff>
--- a/slides/CSFG7.pptx
+++ b/slides/CSFG7.pptx
@@ -10882,7 +10882,23 @@
                   <a:srgbClr val="FFFF99"/>
                 </a:solidFill>
               </a:rPr>
-              <a:t>... Spearman R is 0.19, p=0.067 – not significant!</a:t>
+              <a:t>... Spearman R is 0.19, p=</a:t>
+            </a:r>
+            <a:r>
+              <a:rPr lang="en-GB" sz="2800" dirty="0" smtClean="0">
+                <a:solidFill>
+                  <a:srgbClr val="FFFF99"/>
+                </a:solidFill>
+              </a:rPr>
+              <a:t>0.087 </a:t>
+            </a:r>
+            <a:r>
+              <a:rPr lang="en-GB" sz="2800" dirty="0">
+                <a:solidFill>
+                  <a:srgbClr val="FFFF99"/>
+                </a:solidFill>
+              </a:rPr>
+              <a:t>– not significant!</a:t>
             </a:r>
           </a:p>
           <a:p>
@@ -32254,15 +32270,15 @@
               </a:spcBef>
             </a:pPr>
             <a:r>
-              <a:rPr lang="en-GB" sz="2800"/>
+              <a:rPr lang="en-GB" sz="2800" dirty="0"/>
               <a:t>Some tests are </a:t>
             </a:r>
             <a:r>
-              <a:rPr lang="en-GB" sz="2800" i="1"/>
+              <a:rPr lang="en-GB" sz="2800" i="1" dirty="0"/>
               <a:t>two-tailed </a:t>
             </a:r>
             <a:r>
-              <a:rPr lang="en-GB" sz="2800"/>
+              <a:rPr lang="en-GB" sz="2800" dirty="0"/>
               <a:t>tests</a:t>
             </a:r>
           </a:p>
@@ -32276,26 +32292,26 @@
               </a:spcBef>
             </a:pPr>
             <a:r>
-              <a:rPr lang="en-GB" sz="2800"/>
+              <a:rPr lang="en-GB" sz="2800" dirty="0"/>
               <a:t>H</a:t>
             </a:r>
             <a:r>
-              <a:rPr lang="en-GB" sz="2800" baseline="-25000"/>
+              <a:rPr lang="en-GB" sz="2800" baseline="-25000" dirty="0"/>
               <a:t>1</a:t>
             </a:r>
             <a:r>
-              <a:rPr lang="en-GB" sz="2800"/>
+              <a:rPr lang="en-GB" sz="2800" dirty="0"/>
               <a:t> : </a:t>
             </a:r>
             <a:r>
-              <a:rPr lang="en-GB" sz="2400">
+              <a:rPr lang="en-GB" sz="2400" dirty="0">
                 <a:solidFill>
                   <a:srgbClr val="FFFF99"/>
                 </a:solidFill>
               </a:rPr>
               <a:t>‘The mean maximum grain size is different in the two samples’</a:t>
             </a:r>
-            <a:endParaRPr lang="en-GB" sz="2800"/>
+            <a:endParaRPr lang="en-GB" sz="2800" dirty="0"/>
           </a:p>
           <a:p>
             <a:pPr marL="814388" indent="-814388" eaLnBrk="0" hangingPunct="0">
@@ -32307,7 +32323,7 @@
               </a:spcBef>
             </a:pPr>
             <a:r>
-              <a:rPr lang="en-GB" sz="2800"/>
+              <a:rPr lang="en-GB" sz="2800" dirty="0"/>
               <a:t>Two possible ways it can be different – higher than OR lower than</a:t>
             </a:r>
           </a:p>
@@ -32320,7 +32336,7 @@
                 <a:spcPct val="20000"/>
               </a:spcBef>
             </a:pPr>
-            <a:endParaRPr lang="en-GB" sz="2800" u="sng"/>
+            <a:endParaRPr lang="en-GB" sz="2800" u="sng" dirty="0"/>
           </a:p>
           <a:p>
             <a:pPr marL="814388" indent="-814388" eaLnBrk="0" hangingPunct="0">
@@ -32331,7 +32347,7 @@
                 <a:spcPct val="20000"/>
               </a:spcBef>
             </a:pPr>
-            <a:endParaRPr lang="en-GB" sz="2800" u="sng"/>
+            <a:endParaRPr lang="en-GB" sz="2800" u="sng" dirty="0"/>
           </a:p>
           <a:p>
             <a:pPr marL="814388" indent="-814388" eaLnBrk="0" hangingPunct="0">
@@ -32342,7 +32358,7 @@
                 <a:spcPct val="20000"/>
               </a:spcBef>
             </a:pPr>
-            <a:endParaRPr lang="en-GB" sz="2800"/>
+            <a:endParaRPr lang="en-GB" sz="2800" dirty="0"/>
           </a:p>
           <a:p>
             <a:pPr marL="814388" indent="-814388" eaLnBrk="0" hangingPunct="0">
@@ -32353,7 +32369,7 @@
                 <a:spcPct val="20000"/>
               </a:spcBef>
             </a:pPr>
-            <a:endParaRPr lang="en-GB" sz="2800"/>
+            <a:endParaRPr lang="en-GB" sz="2800" dirty="0"/>
           </a:p>
           <a:p>
             <a:pPr marL="814388" indent="-814388" eaLnBrk="0" hangingPunct="0">
@@ -32365,7 +32381,7 @@
               </a:spcBef>
             </a:pPr>
             <a:r>
-              <a:rPr lang="en-GB" sz="2800"/>
+              <a:rPr lang="en-GB" sz="2800" dirty="0"/>
               <a:t>			</a:t>
             </a:r>
           </a:p>

</xml_diff>